<commit_message>
prep for code camp
</commit_message>
<xml_diff>
--- a/jamine/tech-presentation-jasmine.pptx
+++ b/jamine/tech-presentation-jasmine.pptx
@@ -129,7 +129,7 @@
   </p:defaultTextStyle>
   <p:extLst>
     <p:ext uri="{EFAFB233-063F-42B5-8137-9DF3F51BA10A}">
-      <p15:sldGuideLst xmlns:p15="http://schemas.microsoft.com/office/powerpoint/2012/main" xmlns="">
+      <p15:sldGuideLst xmlns:p15="http://schemas.microsoft.com/office/powerpoint/2012/main">
         <p15:guide id="1" orient="horz" pos="2160">
           <p15:clr>
             <a:srgbClr val="A4A3A4"/>
@@ -228,7 +228,7 @@
           <a:p>
             <a:fld id="{436134EC-835B-48D8-BDB5-96D4A8A8ACE7}" type="datetimeFigureOut">
               <a:rPr lang="en-US" smtClean="0"/>
-              <a:t>11/20/2015</a:t>
+              <a:t>6/20/2016</a:t>
             </a:fld>
             <a:endParaRPr lang="en-US"/>
           </a:p>
@@ -864,7 +864,7 @@
           <a:p>
             <a:fld id="{216C5678-EE20-4FA5-88E2-6E0BD67A2E26}" type="datetime1">
               <a:rPr lang="en-US" smtClean="0"/>
-              <a:t>11/20/2015</a:t>
+              <a:t>6/20/2016</a:t>
             </a:fld>
             <a:endParaRPr lang="en-US" dirty="0"/>
           </a:p>
@@ -1034,7 +1034,7 @@
           <a:p>
             <a:fld id="{EA051B39-B140-43FE-96DB-472A2B59CE7C}" type="datetime1">
               <a:rPr lang="en-US" smtClean="0"/>
-              <a:t>11/20/2015</a:t>
+              <a:t>6/20/2016</a:t>
             </a:fld>
             <a:endParaRPr lang="en-US"/>
           </a:p>
@@ -1214,7 +1214,7 @@
           <a:p>
             <a:fld id="{DA600BB2-27C5-458B-ABCE-839C88CF47CE}" type="datetime1">
               <a:rPr lang="en-US" smtClean="0"/>
-              <a:t>11/20/2015</a:t>
+              <a:t>6/20/2016</a:t>
             </a:fld>
             <a:endParaRPr lang="en-US"/>
           </a:p>
@@ -1402,7 +1402,7 @@
           <a:p>
             <a:fld id="{B11D738E-8962-435F-8C43-147B8DD7E819}" type="datetime1">
               <a:rPr lang="en-US" smtClean="0"/>
-              <a:t>11/20/2015</a:t>
+              <a:t>6/20/2016</a:t>
             </a:fld>
             <a:endParaRPr lang="en-US"/>
           </a:p>
@@ -1669,7 +1669,7 @@
           <a:p>
             <a:fld id="{09CAEA93-55E7-4DA9-90C2-089A26EEFEC4}" type="datetime1">
               <a:rPr lang="en-US" smtClean="0"/>
-              <a:t>11/20/2015</a:t>
+              <a:t>6/20/2016</a:t>
             </a:fld>
             <a:endParaRPr lang="en-US"/>
           </a:p>
@@ -2022,7 +2022,7 @@
           <a:p>
             <a:fld id="{E34CF3C7-6809-4F39-BD67-A75817BDDE0A}" type="datetime1">
               <a:rPr lang="en-US" smtClean="0"/>
-              <a:t>11/20/2015</a:t>
+              <a:t>6/20/2016</a:t>
             </a:fld>
             <a:endParaRPr lang="en-US"/>
           </a:p>
@@ -2335,7 +2335,7 @@
           <a:p>
             <a:fld id="{F7EAEB24-CE78-465C-A726-91D0868FA48F}" type="datetime1">
               <a:rPr lang="en-US" smtClean="0"/>
-              <a:t>11/20/2015</a:t>
+              <a:t>6/20/2016</a:t>
             </a:fld>
             <a:endParaRPr lang="en-US"/>
           </a:p>
@@ -2567,7 +2567,7 @@
           <a:p>
             <a:fld id="{40BAADF0-1749-4E8B-9691-B44A5F8C0895}" type="datetime1">
               <a:rPr lang="en-US" smtClean="0"/>
-              <a:t>11/20/2015</a:t>
+              <a:t>6/20/2016</a:t>
             </a:fld>
             <a:endParaRPr lang="en-US"/>
           </a:p>
@@ -2662,7 +2662,7 @@
           <a:p>
             <a:fld id="{A8AF628A-A867-4937-BBE5-207DB6F9C51A}" type="datetime1">
               <a:rPr lang="en-US" smtClean="0"/>
-              <a:t>11/20/2015</a:t>
+              <a:t>6/20/2016</a:t>
             </a:fld>
             <a:endParaRPr lang="en-US"/>
           </a:p>
@@ -2955,7 +2955,7 @@
           <a:p>
             <a:fld id="{118BBB94-68E6-4675-A946-F1C5994EDBD7}" type="datetime1">
               <a:rPr lang="en-US" smtClean="0"/>
-              <a:t>11/20/2015</a:t>
+              <a:t>6/20/2016</a:t>
             </a:fld>
             <a:endParaRPr lang="en-US"/>
           </a:p>
@@ -3229,7 +3229,7 @@
           <a:p>
             <a:fld id="{DC3B8377-21E3-4835-B75D-4E2847E2750F}" type="datetime1">
               <a:rPr lang="en-US" smtClean="0"/>
-              <a:t>11/20/2015</a:t>
+              <a:t>6/20/2016</a:t>
             </a:fld>
             <a:endParaRPr lang="en-US"/>
           </a:p>
@@ -3444,7 +3444,7 @@
           <a:p>
             <a:fld id="{B0C4986D-6BE9-4264-908F-02DB36FD8D6C}" type="datetime1">
               <a:rPr lang="en-US" smtClean="0"/>
-              <a:t>11/20/2015</a:t>
+              <a:t>6/20/2016</a:t>
             </a:fld>
             <a:endParaRPr lang="en-US" dirty="0"/>
           </a:p>
@@ -3978,83 +3978,114 @@
             <p:ph type="ctrTitle"/>
           </p:nvPr>
         </p:nvSpPr>
+        <p:spPr>
+          <a:xfrm>
+            <a:off x="703555" y="533400"/>
+            <a:ext cx="7772400" cy="2133600"/>
+          </a:xfrm>
+        </p:spPr>
+        <p:txBody>
+          <a:bodyPr/>
+          <a:lstStyle/>
+          <a:p>
+            <a:r>
+              <a:rPr lang="en-US" sz="6000" dirty="0" err="1" smtClean="0"/>
+              <a:t>Javascript</a:t>
+            </a:r>
+            <a:r>
+              <a:rPr lang="en-US" sz="6000" dirty="0" smtClean="0"/>
+              <a:t> Testing with Jasmine</a:t>
+            </a:r>
+            <a:endParaRPr lang="en-US" sz="6000" dirty="0"/>
+          </a:p>
+        </p:txBody>
+      </p:sp>
+      <p:sp>
+        <p:nvSpPr>
+          <p:cNvPr id="3" name="Subtitle 2"/>
+          <p:cNvSpPr>
+            <a:spLocks noGrp="1"/>
+          </p:cNvSpPr>
+          <p:nvPr>
+            <p:ph type="subTitle" idx="1"/>
+          </p:nvPr>
+        </p:nvSpPr>
+        <p:spPr>
+          <a:xfrm>
+            <a:off x="76200" y="3124200"/>
+            <a:ext cx="8839200" cy="3048000"/>
+          </a:xfrm>
+        </p:spPr>
+        <p:txBody>
+          <a:bodyPr>
+            <a:normAutofit/>
+          </a:bodyPr>
+          <a:lstStyle/>
+          <a:p>
+            <a:r>
+              <a:rPr lang="en-US" dirty="0" smtClean="0"/>
+              <a:t>Presenter: Hoanh Tran</a:t>
+            </a:r>
+            <a:br>
+              <a:rPr lang="en-US" dirty="0" smtClean="0"/>
+            </a:br>
+            <a:r>
+              <a:rPr lang="en-US" dirty="0" smtClean="0">
+                <a:hlinkClick r:id="rId2"/>
+              </a:rPr>
+              <a:t>h</a:t>
+            </a:r>
+            <a:r>
+              <a:rPr lang="en-US" dirty="0" smtClean="0">
+                <a:hlinkClick r:id="rId2"/>
+              </a:rPr>
+              <a:t>oanh_tran@yahoo.com</a:t>
+            </a:r>
+            <a:endParaRPr lang="en-US" dirty="0" smtClean="0"/>
+          </a:p>
+          <a:p>
+            <a:endParaRPr lang="en-US" dirty="0" smtClean="0"/>
+          </a:p>
+          <a:p>
+            <a:r>
+              <a:rPr lang="en-US" dirty="0" smtClean="0"/>
+              <a:t>Code Download: </a:t>
+            </a:r>
+          </a:p>
+          <a:p>
+            <a:r>
+              <a:rPr lang="en-US" dirty="0" smtClean="0"/>
+              <a:t>https</a:t>
+            </a:r>
+            <a:r>
+              <a:rPr lang="en-US" dirty="0"/>
+              <a:t>://github.com/h-t-tran/brown/tree/master/jamine</a:t>
+            </a:r>
+            <a:endParaRPr lang="en-US" dirty="0" smtClean="0"/>
+          </a:p>
+          <a:p>
+            <a:endParaRPr lang="en-US" dirty="0"/>
+          </a:p>
+        </p:txBody>
+      </p:sp>
+      <p:sp>
+        <p:nvSpPr>
+          <p:cNvPr id="4" name="Date Placeholder 3"/>
+          <p:cNvSpPr>
+            <a:spLocks noGrp="1"/>
+          </p:cNvSpPr>
+          <p:nvPr>
+            <p:ph type="dt" sz="half" idx="10"/>
+          </p:nvPr>
+        </p:nvSpPr>
         <p:spPr/>
         <p:txBody>
           <a:bodyPr/>
           <a:lstStyle/>
           <a:p>
-            <a:r>
-              <a:rPr lang="en-US" dirty="0" err="1" smtClean="0"/>
-              <a:t>Javascript</a:t>
-            </a:r>
-            <a:r>
-              <a:rPr lang="en-US" dirty="0" smtClean="0"/>
-              <a:t> Testing with Jasmine</a:t>
-            </a:r>
-            <a:endParaRPr lang="en-US" dirty="0"/>
-          </a:p>
-        </p:txBody>
-      </p:sp>
-      <p:sp>
-        <p:nvSpPr>
-          <p:cNvPr id="3" name="Subtitle 2"/>
-          <p:cNvSpPr>
-            <a:spLocks noGrp="1"/>
-          </p:cNvSpPr>
-          <p:nvPr>
-            <p:ph type="subTitle" idx="1"/>
-          </p:nvPr>
-        </p:nvSpPr>
-        <p:spPr/>
-        <p:txBody>
-          <a:bodyPr/>
-          <a:lstStyle/>
-          <a:p>
-            <a:r>
-              <a:rPr lang="en-US" dirty="0" smtClean="0"/>
-              <a:t>Presenter: </a:t>
-            </a:r>
-            <a:r>
-              <a:rPr lang="en-US" dirty="0" err="1" smtClean="0"/>
-              <a:t>Hoanh</a:t>
-            </a:r>
-            <a:r>
-              <a:rPr lang="en-US" dirty="0" smtClean="0"/>
-              <a:t> Tran</a:t>
-            </a:r>
-            <a:r>
-              <a:rPr lang="en-US" smtClean="0"/>
-              <a:t/>
-            </a:r>
-            <a:br>
-              <a:rPr lang="en-US" smtClean="0"/>
-            </a:br>
-            <a:r>
-              <a:rPr lang="en-US" smtClean="0"/>
-              <a:t>11/10/2015</a:t>
-            </a:r>
-            <a:endParaRPr lang="en-US" dirty="0"/>
-          </a:p>
-        </p:txBody>
-      </p:sp>
-      <p:sp>
-        <p:nvSpPr>
-          <p:cNvPr id="4" name="Date Placeholder 3"/>
-          <p:cNvSpPr>
-            <a:spLocks noGrp="1"/>
-          </p:cNvSpPr>
-          <p:nvPr>
-            <p:ph type="dt" sz="half" idx="10"/>
-          </p:nvPr>
-        </p:nvSpPr>
-        <p:spPr/>
-        <p:txBody>
-          <a:bodyPr/>
-          <a:lstStyle/>
-          <a:p>
             <a:fld id="{216C5678-EE20-4FA5-88E2-6E0BD67A2E26}" type="datetime1">
               <a:rPr lang="en-US" smtClean="0"/>
-              <a:t>11/20/2015</a:t>
+              <a:t>6/20/2016</a:t>
             </a:fld>
             <a:endParaRPr lang="en-US" dirty="0"/>
           </a:p>
@@ -4183,7 +4214,7 @@
           <a:p>
             <a:fld id="{216C5678-EE20-4FA5-88E2-6E0BD67A2E26}" type="datetime1">
               <a:rPr lang="en-US" smtClean="0"/>
-              <a:t>11/20/2015</a:t>
+              <a:t>6/20/2016</a:t>
             </a:fld>
             <a:endParaRPr lang="en-US" dirty="0"/>
           </a:p>
@@ -4344,7 +4375,7 @@
           <a:p>
             <a:fld id="{216C5678-EE20-4FA5-88E2-6E0BD67A2E26}" type="datetime1">
               <a:rPr lang="en-US" smtClean="0"/>
-              <a:t>11/20/2015</a:t>
+              <a:t>6/20/2016</a:t>
             </a:fld>
             <a:endParaRPr lang="en-US" dirty="0"/>
           </a:p>
@@ -4452,15 +4483,7 @@
             <a:pPr algn="l"/>
             <a:r>
               <a:rPr lang="en-US" dirty="0" smtClean="0"/>
-              <a:t>     if( “</a:t>
-            </a:r>
-            <a:r>
-              <a:rPr lang="en-US" dirty="0" smtClean="0"/>
-              <a:t>should… </a:t>
-            </a:r>
-            <a:r>
-              <a:rPr lang="en-US" dirty="0" smtClean="0"/>
-              <a:t>“, function(</a:t>
+              <a:t>     if( “should… “, function(</a:t>
             </a:r>
             <a:r>
               <a:rPr lang="en-US" dirty="0" err="1" smtClean="0"/>
@@ -4475,15 +4498,7 @@
             <a:pPr algn="l"/>
             <a:r>
               <a:rPr lang="en-US" dirty="0" smtClean="0"/>
-              <a:t>         </a:t>
-            </a:r>
-            <a:r>
-              <a:rPr lang="en-US" dirty="0" smtClean="0"/>
-              <a:t>            // </a:t>
-            </a:r>
-            <a:r>
-              <a:rPr lang="en-US" dirty="0" smtClean="0"/>
-              <a:t>execute </a:t>
+              <a:t>                     // execute </a:t>
             </a:r>
             <a:r>
               <a:rPr lang="en-US" dirty="0" err="1" smtClean="0"/>
@@ -4502,13 +4517,8 @@
             </a:r>
             <a:r>
               <a:rPr lang="en-US" dirty="0" smtClean="0"/>
-              <a:t>        </a:t>
-            </a:r>
-            <a:r>
-              <a:rPr lang="en-US" dirty="0" smtClean="0"/>
-              <a:t>            done ();</a:t>
-            </a:r>
-            <a:endParaRPr lang="en-US" dirty="0" smtClean="0"/>
+              <a:t>                    done ();</a:t>
+            </a:r>
           </a:p>
           <a:p>
             <a:pPr algn="l"/>
@@ -4692,7 +4702,7 @@
           <a:p>
             <a:fld id="{216C5678-EE20-4FA5-88E2-6E0BD67A2E26}" type="datetime1">
               <a:rPr lang="en-US" smtClean="0"/>
-              <a:t>11/20/2015</a:t>
+              <a:t>6/20/2016</a:t>
             </a:fld>
             <a:endParaRPr lang="en-US" dirty="0"/>
           </a:p>
@@ -4795,11 +4805,7 @@
             </a:r>
             <a:r>
               <a:rPr lang="en-US" b="1" dirty="0" smtClean="0"/>
-              <a:t>ode </a:t>
-            </a:r>
-            <a:r>
-              <a:rPr lang="en-US" b="1" dirty="0" smtClean="0"/>
-              <a:t>demo</a:t>
+              <a:t>ode demo</a:t>
             </a:r>
             <a:endParaRPr lang="en-US" b="1" dirty="0"/>
           </a:p>
@@ -4885,7 +4891,7 @@
           <a:p>
             <a:fld id="{216C5678-EE20-4FA5-88E2-6E0BD67A2E26}" type="datetime1">
               <a:rPr lang="en-US" smtClean="0"/>
-              <a:t>11/20/2015</a:t>
+              <a:t>6/20/2016</a:t>
             </a:fld>
             <a:endParaRPr lang="en-US" dirty="0"/>
           </a:p>
@@ -5265,7 +5271,7 @@
           <a:p>
             <a:fld id="{216C5678-EE20-4FA5-88E2-6E0BD67A2E26}" type="datetime1">
               <a:rPr lang="en-US" smtClean="0"/>
-              <a:t>11/20/2015</a:t>
+              <a:t>6/20/2016</a:t>
             </a:fld>
             <a:endParaRPr lang="en-US" dirty="0"/>
           </a:p>
@@ -5487,7 +5493,7 @@
           <a:p>
             <a:fld id="{216C5678-EE20-4FA5-88E2-6E0BD67A2E26}" type="datetime1">
               <a:rPr lang="en-US" smtClean="0"/>
-              <a:t>11/20/2015</a:t>
+              <a:t>6/20/2016</a:t>
             </a:fld>
             <a:endParaRPr lang="en-US" dirty="0"/>
           </a:p>
@@ -5702,7 +5708,7 @@
           <a:p>
             <a:fld id="{216C5678-EE20-4FA5-88E2-6E0BD67A2E26}" type="datetime1">
               <a:rPr lang="en-US" smtClean="0"/>
-              <a:t>11/20/2015</a:t>
+              <a:t>6/20/2016</a:t>
             </a:fld>
             <a:endParaRPr lang="en-US" dirty="0"/>
           </a:p>
@@ -6016,7 +6022,7 @@
           <a:p>
             <a:fld id="{216C5678-EE20-4FA5-88E2-6E0BD67A2E26}" type="datetime1">
               <a:rPr lang="en-US" smtClean="0"/>
-              <a:t>11/20/2015</a:t>
+              <a:t>6/20/2016</a:t>
             </a:fld>
             <a:endParaRPr lang="en-US" dirty="0"/>
           </a:p>
@@ -6268,7 +6274,7 @@
           <a:p>
             <a:fld id="{216C5678-EE20-4FA5-88E2-6E0BD67A2E26}" type="datetime1">
               <a:rPr lang="en-US" smtClean="0"/>
-              <a:t>11/20/2015</a:t>
+              <a:t>6/20/2016</a:t>
             </a:fld>
             <a:endParaRPr lang="en-US" dirty="0"/>
           </a:p>
@@ -6653,7 +6659,7 @@
           <a:p>
             <a:fld id="{216C5678-EE20-4FA5-88E2-6E0BD67A2E26}" type="datetime1">
               <a:rPr lang="en-US" smtClean="0"/>
-              <a:t>11/20/2015</a:t>
+              <a:t>6/20/2016</a:t>
             </a:fld>
             <a:endParaRPr lang="en-US" dirty="0"/>
           </a:p>
@@ -7037,7 +7043,6 @@
               <a:rPr lang="en-US" sz="3200" dirty="0" smtClean="0"/>
               <a:t>.</a:t>
             </a:r>
-            <a:endParaRPr lang="en-US" sz="3200" dirty="0" smtClean="0"/>
           </a:p>
           <a:p>
             <a:pPr marL="342900" indent="-342900" algn="l">
@@ -7135,7 +7140,7 @@
           <a:p>
             <a:fld id="{216C5678-EE20-4FA5-88E2-6E0BD67A2E26}" type="datetime1">
               <a:rPr lang="en-US" smtClean="0"/>
-              <a:t>11/20/2015</a:t>
+              <a:t>6/20/2016</a:t>
             </a:fld>
             <a:endParaRPr lang="en-US" dirty="0"/>
           </a:p>
@@ -7264,7 +7269,7 @@
           <a:p>
             <a:fld id="{216C5678-EE20-4FA5-88E2-6E0BD67A2E26}" type="datetime1">
               <a:rPr lang="en-US" smtClean="0"/>
-              <a:t>11/20/2015</a:t>
+              <a:t>6/20/2016</a:t>
             </a:fld>
             <a:endParaRPr lang="en-US" dirty="0"/>
           </a:p>
@@ -7629,7 +7634,7 @@
           <a:p>
             <a:fld id="{216C5678-EE20-4FA5-88E2-6E0BD67A2E26}" type="datetime1">
               <a:rPr lang="en-US" smtClean="0"/>
-              <a:t>11/20/2015</a:t>
+              <a:t>6/20/2016</a:t>
             </a:fld>
             <a:endParaRPr lang="en-US" dirty="0"/>
           </a:p>
@@ -7983,7 +7988,7 @@
           <a:p>
             <a:fld id="{216C5678-EE20-4FA5-88E2-6E0BD67A2E26}" type="datetime1">
               <a:rPr lang="en-US" smtClean="0"/>
-              <a:t>11/20/2015</a:t>
+              <a:t>6/20/2016</a:t>
             </a:fld>
             <a:endParaRPr lang="en-US" dirty="0"/>
           </a:p>
@@ -8080,8 +8085,21 @@
             </a:r>
             <a:r>
               <a:rPr lang="en-US" dirty="0" smtClean="0"/>
-              <a:t> as Junit is to Java.</a:t>
-            </a:r>
+              <a:t> as Junit is to </a:t>
+            </a:r>
+            <a:r>
+              <a:rPr lang="en-US" dirty="0" smtClean="0"/>
+              <a:t>Java or </a:t>
+            </a:r>
+            <a:r>
+              <a:rPr lang="en-US" dirty="0" err="1" smtClean="0"/>
+              <a:t>Nunit</a:t>
+            </a:r>
+            <a:r>
+              <a:rPr lang="en-US" dirty="0" smtClean="0"/>
+              <a:t> is to C#.</a:t>
+            </a:r>
+            <a:endParaRPr lang="en-US" dirty="0" smtClean="0"/>
           </a:p>
           <a:p>
             <a:pPr marL="342900" indent="-342900" algn="l">
@@ -8213,7 +8231,7 @@
           <a:p>
             <a:fld id="{216C5678-EE20-4FA5-88E2-6E0BD67A2E26}" type="datetime1">
               <a:rPr lang="en-US" smtClean="0"/>
-              <a:t>11/20/2015</a:t>
+              <a:t>6/20/2016</a:t>
             </a:fld>
             <a:endParaRPr lang="en-US" dirty="0"/>
           </a:p>
@@ -8434,7 +8452,7 @@
           <a:p>
             <a:fld id="{216C5678-EE20-4FA5-88E2-6E0BD67A2E26}" type="datetime1">
               <a:rPr lang="en-US" smtClean="0"/>
-              <a:t>11/20/2015</a:t>
+              <a:t>6/20/2016</a:t>
             </a:fld>
             <a:endParaRPr lang="en-US" dirty="0"/>
           </a:p>
@@ -8723,7 +8741,7 @@
           <a:p>
             <a:fld id="{216C5678-EE20-4FA5-88E2-6E0BD67A2E26}" type="datetime1">
               <a:rPr lang="en-US" smtClean="0"/>
-              <a:t>11/20/2015</a:t>
+              <a:t>6/20/2016</a:t>
             </a:fld>
             <a:endParaRPr lang="en-US" dirty="0"/>
           </a:p>
@@ -9145,7 +9163,7 @@
           <a:p>
             <a:fld id="{216C5678-EE20-4FA5-88E2-6E0BD67A2E26}" type="datetime1">
               <a:rPr lang="en-US" smtClean="0"/>
-              <a:t>11/20/2015</a:t>
+              <a:t>6/20/2016</a:t>
             </a:fld>
             <a:endParaRPr lang="en-US" dirty="0"/>
           </a:p>
@@ -10026,7 +10044,7 @@
           <a:p>
             <a:fld id="{216C5678-EE20-4FA5-88E2-6E0BD67A2E26}" type="datetime1">
               <a:rPr lang="en-US" smtClean="0"/>
-              <a:t>11/20/2015</a:t>
+              <a:t>6/20/2016</a:t>
             </a:fld>
             <a:endParaRPr lang="en-US" dirty="0"/>
           </a:p>
@@ -10429,7 +10447,7 @@
           <a:p>
             <a:fld id="{216C5678-EE20-4FA5-88E2-6E0BD67A2E26}" type="datetime1">
               <a:rPr lang="en-US" smtClean="0"/>
-              <a:t>11/20/2015</a:t>
+              <a:t>6/20/2016</a:t>
             </a:fld>
             <a:endParaRPr lang="en-US" dirty="0"/>
           </a:p>

</xml_diff>